<commit_message>
Correct omissions on license/acknowledgements slide
</commit_message>
<xml_diff>
--- a/presentations/final-presentations/2020-08-06-atpesc/04-design.pptx
+++ b/presentations/final-presentations/2020-08-06-atpesc/04-design.pptx
@@ -12,7 +12,7 @@
   </p:handoutMasterIdLst>
   <p:sldIdLst>
     <p:sldId id="318" r:id="rId5"/>
-    <p:sldId id="320" r:id="rId6"/>
+    <p:sldId id="615" r:id="rId6"/>
     <p:sldId id="586" r:id="rId7"/>
     <p:sldId id="593" r:id="rId8"/>
     <p:sldId id="610" r:id="rId9"/>
@@ -284,7 +284,7 @@
           <a:p>
             <a:fld id="{0B842F42-2CE9-4E35-95C1-410DC08A50B1}" type="datetimeFigureOut">
               <a:rPr lang="en-US" smtClean="0"/>
-              <a:t>8/3/2020</a:t>
+              <a:t>8/5/2020</a:t>
             </a:fld>
             <a:endParaRPr lang="en-US"/>
           </a:p>
@@ -449,7 +449,7 @@
           <a:p>
             <a:fld id="{6F282904-F315-4730-8D91-37D99E141A6F}" type="datetimeFigureOut">
               <a:rPr lang="en-US" smtClean="0"/>
-              <a:t>8/3/2020</a:t>
+              <a:t>8/5/2020</a:t>
             </a:fld>
             <a:endParaRPr lang="en-US"/>
           </a:p>
@@ -1894,7 +1894,7 @@
           <a:noFill/>
           <a:extLst>
             <a:ext uri="{909E8E84-426E-40dd-AFC4-6F175D3DCCD1}">
-              <a14:hiddenFill xmlns="" xmlns:a14="http://schemas.microsoft.com/office/drawing/2010/main">
+              <a14:hiddenFill xmlns:a14="http://schemas.microsoft.com/office/drawing/2010/main" xmlns="">
                 <a:solidFill>
                   <a:srgbClr val="FFFFFF"/>
                 </a:solidFill>
@@ -2048,7 +2048,7 @@
           <a:noFill/>
           <a:extLst>
             <a:ext uri="{909E8E84-426E-40dd-AFC4-6F175D3DCCD1}">
-              <a14:hiddenFill xmlns="" xmlns:a14="http://schemas.microsoft.com/office/drawing/2010/main">
+              <a14:hiddenFill xmlns:a14="http://schemas.microsoft.com/office/drawing/2010/main" xmlns="">
                 <a:solidFill>
                   <a:srgbClr val="FFFFFF"/>
                 </a:solidFill>
@@ -10150,7 +10150,7 @@
             <a:fld id="{B557289E-1B3F-4E63-935A-0E0E5EBBCF05}" type="datetime1">
               <a:rPr lang="en-US" smtClean="0"/>
               <a:pPr/>
-              <a:t>8/3/2020</a:t>
+              <a:t>8/5/2020</a:t>
             </a:fld>
             <a:endParaRPr lang="en-US"/>
           </a:p>
@@ -10621,7 +10621,7 @@
             <a:fld id="{B557289E-1B3F-4E63-935A-0E0E5EBBCF05}" type="datetime1">
               <a:rPr lang="en-US" smtClean="0"/>
               <a:pPr/>
-              <a:t>8/3/2020</a:t>
+              <a:t>8/5/2020</a:t>
             </a:fld>
             <a:endParaRPr lang="en-US"/>
           </a:p>
@@ -11364,7 +11364,7 @@
             </a:r>
             <a:r>
               <a:rPr lang="en-US" sz="1600" b="1" dirty="0"/>
-              <a:t>, Software Productivity Track, in Argonne Training Program for Extreme Scale Computing (ATPESC), online. DOI: </a:t>
+              <a:t>, Software Productivity Track, in Argonne Training Program for Extreme Scale Computing (ATPESC), August 2020, online. DOI: </a:t>
             </a:r>
             <a:r>
               <a:rPr lang="en-US" sz="1600" b="1" dirty="0">
@@ -11395,6 +11395,9 @@
           </a:p>
           <a:p>
             <a:pPr marL="0" indent="0">
+              <a:spcBef>
+                <a:spcPts val="800"/>
+              </a:spcBef>
               <a:buNone/>
             </a:pPr>
             <a:r>
@@ -11426,7 +11429,7 @@
             </a:r>
             <a:r>
               <a:rPr lang="en-US" sz="1600" dirty="0"/>
-              <a:t>, Jared O’Neal, David Rogers</a:t>
+              <a:t>, Jared O’Neal, David Rogers, Deborah Stevens</a:t>
             </a:r>
           </a:p>
           <a:p>
@@ -11557,7 +11560,7 @@
     </p:spTree>
     <p:extLst>
       <p:ext uri="{BB962C8B-B14F-4D97-AF65-F5344CB8AC3E}">
-        <p14:creationId xmlns:p14="http://schemas.microsoft.com/office/powerpoint/2010/main" val="978726433"/>
+        <p14:creationId xmlns:p14="http://schemas.microsoft.com/office/powerpoint/2010/main" val="1989971478"/>
       </p:ext>
     </p:extLst>
   </p:cSld>
@@ -12556,7 +12559,7 @@
             <a:fld id="{B557289E-1B3F-4E63-935A-0E0E5EBBCF05}" type="datetime1">
               <a:rPr lang="en-US" smtClean="0"/>
               <a:pPr/>
-              <a:t>8/3/2020</a:t>
+              <a:t>8/5/2020</a:t>
             </a:fld>
             <a:endParaRPr lang="en-US"/>
           </a:p>
@@ -17037,7 +17040,7 @@
             <a:fld id="{B557289E-1B3F-4E63-935A-0E0E5EBBCF05}" type="datetime1">
               <a:rPr lang="en-US" smtClean="0"/>
               <a:pPr/>
-              <a:t>8/3/2020</a:t>
+              <a:t>8/5/2020</a:t>
             </a:fld>
             <a:endParaRPr lang="en-US"/>
           </a:p>
@@ -27843,18 +27846,18 @@
 </file>
 
 <file path=customXml/item1.xml><?xml version="1.0" encoding="utf-8"?>
-<p:properties xmlns:p="http://schemas.microsoft.com/office/2006/metadata/properties" xmlns:xsi="http://www.w3.org/2001/XMLSchema-instance" xmlns:pc="http://schemas.microsoft.com/office/infopath/2007/PartnerControls">
-  <documentManagement/>
-</p:properties>
-</file>
-
-<file path=customXml/item2.xml><?xml version="1.0" encoding="utf-8"?>
 <?mso-contentType ?>
 <FormTemplates xmlns="http://schemas.microsoft.com/sharepoint/v3/contenttype/forms">
   <Display>DocumentLibraryForm</Display>
   <Edit>DocumentLibraryForm</Edit>
   <New>DocumentLibraryForm</New>
 </FormTemplates>
+</file>
+
+<file path=customXml/item2.xml><?xml version="1.0" encoding="utf-8"?>
+<p:properties xmlns:p="http://schemas.microsoft.com/office/2006/metadata/properties" xmlns:xsi="http://www.w3.org/2001/XMLSchema-instance" xmlns:pc="http://schemas.microsoft.com/office/infopath/2007/PartnerControls">
+  <documentManagement/>
+</p:properties>
 </file>
 
 <file path=customXml/item3.xml><?xml version="1.0" encoding="utf-8"?>
@@ -27907,6 +27910,14 @@
 </file>
 
 <file path=customXml/itemProps1.xml><?xml version="1.0" encoding="utf-8"?>
+<ds:datastoreItem xmlns:ds="http://schemas.openxmlformats.org/officeDocument/2006/customXml" ds:itemID="{19E20559-B232-4371-8690-E3D8007EDB82}">
+  <ds:schemaRefs>
+    <ds:schemaRef ds:uri="http://schemas.microsoft.com/sharepoint/v3/contenttype/forms"/>
+  </ds:schemaRefs>
+</ds:datastoreItem>
+</file>
+
+<file path=customXml/itemProps2.xml><?xml version="1.0" encoding="utf-8"?>
 <ds:datastoreItem xmlns:ds="http://schemas.openxmlformats.org/officeDocument/2006/customXml" ds:itemID="{A50EC660-24D0-43A0-AE5E-E274115E726B}">
   <ds:schemaRefs>
     <ds:schemaRef ds:uri="http://purl.org/dc/terms/"/>
@@ -27917,14 +27928,6 @@
     <ds:schemaRef ds:uri="http://www.w3.org/XML/1998/namespace"/>
     <ds:schemaRef ds:uri="http://purl.org/dc/dcmitype/"/>
     <ds:schemaRef ds:uri="http://schemas.microsoft.com/office/infopath/2007/PartnerControls"/>
-  </ds:schemaRefs>
-</ds:datastoreItem>
-</file>
-
-<file path=customXml/itemProps2.xml><?xml version="1.0" encoding="utf-8"?>
-<ds:datastoreItem xmlns:ds="http://schemas.openxmlformats.org/officeDocument/2006/customXml" ds:itemID="{19E20559-B232-4371-8690-E3D8007EDB82}">
-  <ds:schemaRefs>
-    <ds:schemaRef ds:uri="http://schemas.microsoft.com/sharepoint/v3/contenttype/forms"/>
   </ds:schemaRefs>
 </ds:datastoreItem>
 </file>

</xml_diff>

<commit_message>
stuck in link in the design presentation
</commit_message>
<xml_diff>
--- a/presentations/final-presentations/2020-08-06-atpesc/04-design.pptx
+++ b/presentations/final-presentations/2020-08-06-atpesc/04-design.pptx
@@ -284,7 +284,7 @@
           <a:p>
             <a:fld id="{0B842F42-2CE9-4E35-95C1-410DC08A50B1}" type="datetimeFigureOut">
               <a:rPr lang="en-US" smtClean="0"/>
-              <a:t>8/5/2020</a:t>
+              <a:t>8/6/20</a:t>
             </a:fld>
             <a:endParaRPr lang="en-US"/>
           </a:p>
@@ -449,7 +449,7 @@
           <a:p>
             <a:fld id="{6F282904-F315-4730-8D91-37D99E141A6F}" type="datetimeFigureOut">
               <a:rPr lang="en-US" smtClean="0"/>
-              <a:t>8/5/2020</a:t>
+              <a:t>8/6/20</a:t>
             </a:fld>
             <a:endParaRPr lang="en-US"/>
           </a:p>
@@ -1894,7 +1894,7 @@
           <a:noFill/>
           <a:extLst>
             <a:ext uri="{909E8E84-426E-40dd-AFC4-6F175D3DCCD1}">
-              <a14:hiddenFill xmlns:a14="http://schemas.microsoft.com/office/drawing/2010/main" xmlns="">
+              <a14:hiddenFill xmlns="" xmlns:a14="http://schemas.microsoft.com/office/drawing/2010/main">
                 <a:solidFill>
                   <a:srgbClr val="FFFFFF"/>
                 </a:solidFill>
@@ -2048,7 +2048,7 @@
           <a:noFill/>
           <a:extLst>
             <a:ext uri="{909E8E84-426E-40dd-AFC4-6F175D3DCCD1}">
-              <a14:hiddenFill xmlns:a14="http://schemas.microsoft.com/office/drawing/2010/main" xmlns="">
+              <a14:hiddenFill xmlns="" xmlns:a14="http://schemas.microsoft.com/office/drawing/2010/main">
                 <a:solidFill>
                   <a:srgbClr val="FFFFFF"/>
                 </a:solidFill>
@@ -10150,7 +10150,7 @@
             <a:fld id="{B557289E-1B3F-4E63-935A-0E0E5EBBCF05}" type="datetime1">
               <a:rPr lang="en-US" smtClean="0"/>
               <a:pPr/>
-              <a:t>8/5/2020</a:t>
+              <a:t>8/6/20</a:t>
             </a:fld>
             <a:endParaRPr lang="en-US"/>
           </a:p>
@@ -10621,7 +10621,7 @@
             <a:fld id="{B557289E-1B3F-4E63-935A-0E0E5EBBCF05}" type="datetime1">
               <a:rPr lang="en-US" smtClean="0"/>
               <a:pPr/>
-              <a:t>8/5/2020</a:t>
+              <a:t>8/6/20</a:t>
             </a:fld>
             <a:endParaRPr lang="en-US"/>
           </a:p>
@@ -11226,6 +11226,49 @@
               <a:rPr lang="en-US" dirty="0"/>
               <a:t>The Running Example</a:t>
             </a:r>
+          </a:p>
+        </p:txBody>
+      </p:sp>
+      <p:sp>
+        <p:nvSpPr>
+          <p:cNvPr id="2" name="TextBox 1">
+            <a:extLst>
+              <a:ext uri="{FF2B5EF4-FFF2-40B4-BE49-F238E27FC236}">
+                <a16:creationId xmlns:a16="http://schemas.microsoft.com/office/drawing/2014/main" id="{9F95FB24-758A-2447-8E40-0F912200400E}"/>
+              </a:ext>
+            </a:extLst>
+          </p:cNvPr>
+          <p:cNvSpPr txBox="1"/>
+          <p:nvPr/>
+        </p:nvSpPr>
+        <p:spPr>
+          <a:xfrm>
+            <a:off x="7750630" y="2100862"/>
+            <a:ext cx="2576738" cy="1181862"/>
+          </a:xfrm>
+          <a:prstGeom prst="rect">
+            <a:avLst/>
+          </a:prstGeom>
+          <a:noFill/>
+        </p:spPr>
+        <p:txBody>
+          <a:bodyPr wrap="square" lIns="118872" tIns="91440" rIns="118872" bIns="91440" rtlCol="0" anchor="ctr" anchorCtr="0">
+            <a:spAutoFit/>
+          </a:bodyPr>
+          <a:lstStyle/>
+          <a:p>
+            <a:pPr>
+              <a:lnSpc>
+                <a:spcPct val="90000"/>
+              </a:lnSpc>
+            </a:pPr>
+            <a:r>
+              <a:rPr lang="en-US" dirty="0">
+                <a:hlinkClick r:id="rId3"/>
+              </a:rPr>
+              <a:t>https://github.com/betterscientificsoftware/hello-numerical-world-atpesc-2020</a:t>
+            </a:r>
+            <a:endParaRPr lang="en-US" dirty="0"/>
           </a:p>
         </p:txBody>
       </p:sp>
@@ -12559,7 +12602,7 @@
             <a:fld id="{B557289E-1B3F-4E63-935A-0E0E5EBBCF05}" type="datetime1">
               <a:rPr lang="en-US" smtClean="0"/>
               <a:pPr/>
-              <a:t>8/5/2020</a:t>
+              <a:t>8/6/20</a:t>
             </a:fld>
             <a:endParaRPr lang="en-US"/>
           </a:p>
@@ -17040,7 +17083,7 @@
             <a:fld id="{B557289E-1B3F-4E63-935A-0E0E5EBBCF05}" type="datetime1">
               <a:rPr lang="en-US" smtClean="0"/>
               <a:pPr/>
-              <a:t>8/5/2020</a:t>
+              <a:t>8/6/20</a:t>
             </a:fld>
             <a:endParaRPr lang="en-US"/>
           </a:p>
@@ -27846,18 +27889,18 @@
 </file>
 
 <file path=customXml/item1.xml><?xml version="1.0" encoding="utf-8"?>
+<p:properties xmlns:p="http://schemas.microsoft.com/office/2006/metadata/properties" xmlns:xsi="http://www.w3.org/2001/XMLSchema-instance" xmlns:pc="http://schemas.microsoft.com/office/infopath/2007/PartnerControls">
+  <documentManagement/>
+</p:properties>
+</file>
+
+<file path=customXml/item2.xml><?xml version="1.0" encoding="utf-8"?>
 <?mso-contentType ?>
 <FormTemplates xmlns="http://schemas.microsoft.com/sharepoint/v3/contenttype/forms">
   <Display>DocumentLibraryForm</Display>
   <Edit>DocumentLibraryForm</Edit>
   <New>DocumentLibraryForm</New>
 </FormTemplates>
-</file>
-
-<file path=customXml/item2.xml><?xml version="1.0" encoding="utf-8"?>
-<p:properties xmlns:p="http://schemas.microsoft.com/office/2006/metadata/properties" xmlns:xsi="http://www.w3.org/2001/XMLSchema-instance" xmlns:pc="http://schemas.microsoft.com/office/infopath/2007/PartnerControls">
-  <documentManagement/>
-</p:properties>
 </file>
 
 <file path=customXml/item3.xml><?xml version="1.0" encoding="utf-8"?>
@@ -27910,14 +27953,6 @@
 </file>
 
 <file path=customXml/itemProps1.xml><?xml version="1.0" encoding="utf-8"?>
-<ds:datastoreItem xmlns:ds="http://schemas.openxmlformats.org/officeDocument/2006/customXml" ds:itemID="{19E20559-B232-4371-8690-E3D8007EDB82}">
-  <ds:schemaRefs>
-    <ds:schemaRef ds:uri="http://schemas.microsoft.com/sharepoint/v3/contenttype/forms"/>
-  </ds:schemaRefs>
-</ds:datastoreItem>
-</file>
-
-<file path=customXml/itemProps2.xml><?xml version="1.0" encoding="utf-8"?>
 <ds:datastoreItem xmlns:ds="http://schemas.openxmlformats.org/officeDocument/2006/customXml" ds:itemID="{A50EC660-24D0-43A0-AE5E-E274115E726B}">
   <ds:schemaRefs>
     <ds:schemaRef ds:uri="http://purl.org/dc/terms/"/>
@@ -27928,6 +27963,14 @@
     <ds:schemaRef ds:uri="http://www.w3.org/XML/1998/namespace"/>
     <ds:schemaRef ds:uri="http://purl.org/dc/dcmitype/"/>
     <ds:schemaRef ds:uri="http://schemas.microsoft.com/office/infopath/2007/PartnerControls"/>
+  </ds:schemaRefs>
+</ds:datastoreItem>
+</file>
+
+<file path=customXml/itemProps2.xml><?xml version="1.0" encoding="utf-8"?>
+<ds:datastoreItem xmlns:ds="http://schemas.openxmlformats.org/officeDocument/2006/customXml" ds:itemID="{19E20559-B232-4371-8690-E3D8007EDB82}">
+  <ds:schemaRefs>
+    <ds:schemaRef ds:uri="http://schemas.microsoft.com/sharepoint/v3/contenttype/forms"/>
   </ds:schemaRefs>
 </ds:datastoreItem>
 </file>

</xml_diff>